<commit_message>
[ANV] updated an-simulation overview for SuperCDMS
</commit_message>
<xml_diff>
--- a/2-Flux/bknds_notes/an-simulation.pptx
+++ b/2-Flux/bknds_notes/an-simulation.pptx
@@ -11,6 +11,7 @@
     <p:sldId id="259" r:id="rId5"/>
     <p:sldId id="260" r:id="rId6"/>
     <p:sldId id="261" r:id="rId7"/>
+    <p:sldId id="262" r:id="rId8"/>
   </p:sldIdLst>
   <p:sldSz cx="12192000" cy="6858000"/>
   <p:notesSz cx="6858000" cy="9144000"/>
@@ -5243,6 +5244,198 @@
 </p:sld>
 </file>
 
+<file path=ppt/slides/slide7.xml><?xml version="1.0" encoding="utf-8"?>
+<p:sld xmlns:a="http://schemas.openxmlformats.org/drawingml/2006/main" xmlns:r="http://schemas.openxmlformats.org/officeDocument/2006/relationships" xmlns:p="http://schemas.openxmlformats.org/presentationml/2006/main">
+  <p:cSld>
+    <p:spTree>
+      <p:nvGrpSpPr>
+        <p:cNvPr id="1" name="">
+          <a:extLst>
+            <a:ext uri="{FF2B5EF4-FFF2-40B4-BE49-F238E27FC236}">
+              <a16:creationId xmlns:a16="http://schemas.microsoft.com/office/drawing/2014/main" id="{5E08F42C-1BA4-F841-CD9A-1C65E60D3480}"/>
+            </a:ext>
+          </a:extLst>
+        </p:cNvPr>
+        <p:cNvGrpSpPr/>
+        <p:nvPr/>
+      </p:nvGrpSpPr>
+      <p:grpSpPr>
+        <a:xfrm>
+          <a:off x="0" y="0"/>
+          <a:ext cx="0" cy="0"/>
+          <a:chOff x="0" y="0"/>
+          <a:chExt cx="0" cy="0"/>
+        </a:xfrm>
+      </p:grpSpPr>
+      <p:sp>
+        <p:nvSpPr>
+          <p:cNvPr id="8" name="TextBox 7">
+            <a:extLst>
+              <a:ext uri="{FF2B5EF4-FFF2-40B4-BE49-F238E27FC236}">
+                <a16:creationId xmlns:a16="http://schemas.microsoft.com/office/drawing/2014/main" id="{B625F8CD-3448-BD23-75DE-A52867218956}"/>
+              </a:ext>
+            </a:extLst>
+          </p:cNvPr>
+          <p:cNvSpPr txBox="1"/>
+          <p:nvPr/>
+        </p:nvSpPr>
+        <p:spPr>
+          <a:xfrm>
+            <a:off x="5416386" y="588498"/>
+            <a:ext cx="6318267" cy="923330"/>
+          </a:xfrm>
+          <a:prstGeom prst="rect">
+            <a:avLst/>
+          </a:prstGeom>
+          <a:noFill/>
+        </p:spPr>
+        <p:txBody>
+          <a:bodyPr wrap="square" rtlCol="0">
+            <a:spAutoFit/>
+          </a:bodyPr>
+          <a:lstStyle/>
+          <a:p>
+            <a:r>
+              <a:rPr lang="en-US" dirty="0"/>
+              <a:t>Spontaneous fission is also a contributor to neutrons. Th has somewhat little S.F. but </a:t>
+            </a:r>
+            <a:r>
+              <a:rPr lang="en-US" baseline="30000" dirty="0"/>
+              <a:t>238</a:t>
+            </a:r>
+            <a:r>
+              <a:rPr lang="en-US" dirty="0"/>
+              <a:t>U has a lot more (see left, branching of </a:t>
+            </a:r>
+            <a:r>
+              <a:rPr lang="en-US" b="1" dirty="0"/>
+              <a:t>5.4x10</a:t>
+            </a:r>
+            <a:r>
+              <a:rPr lang="en-US" b="1" baseline="30000" dirty="0"/>
+              <a:t>-5</a:t>
+            </a:r>
+            <a:r>
+              <a:rPr lang="en-US" b="1" dirty="0"/>
+              <a:t> % </a:t>
+            </a:r>
+            <a:r>
+              <a:rPr lang="en-US" dirty="0"/>
+              <a:t>compare with </a:t>
+            </a:r>
+            <a:r>
+              <a:rPr lang="en-US" b="1" dirty="0"/>
+              <a:t>~10</a:t>
+            </a:r>
+            <a:r>
+              <a:rPr lang="en-US" b="1" baseline="30000" dirty="0"/>
+              <a:t>-9</a:t>
+            </a:r>
+            <a:r>
+              <a:rPr lang="en-US" b="1" dirty="0"/>
+              <a:t> % </a:t>
+            </a:r>
+            <a:r>
+              <a:rPr lang="en-US" dirty="0"/>
+              <a:t>for Th). </a:t>
+            </a:r>
+          </a:p>
+        </p:txBody>
+      </p:sp>
+      <p:pic>
+        <p:nvPicPr>
+          <p:cNvPr id="2" name="Picture 1">
+            <a:extLst>
+              <a:ext uri="{FF2B5EF4-FFF2-40B4-BE49-F238E27FC236}">
+                <a16:creationId xmlns:a16="http://schemas.microsoft.com/office/drawing/2014/main" id="{919849FA-65CD-FD19-EA1B-1160777C858B}"/>
+              </a:ext>
+            </a:extLst>
+          </p:cNvPr>
+          <p:cNvPicPr>
+            <a:picLocks noChangeAspect="1"/>
+          </p:cNvPicPr>
+          <p:nvPr/>
+        </p:nvPicPr>
+        <p:blipFill>
+          <a:blip r:embed="rId2"/>
+          <a:stretch>
+            <a:fillRect/>
+          </a:stretch>
+        </p:blipFill>
+        <p:spPr>
+          <a:xfrm>
+            <a:off x="457347" y="446568"/>
+            <a:ext cx="3879573" cy="3850906"/>
+          </a:xfrm>
+          <a:prstGeom prst="rect">
+            <a:avLst/>
+          </a:prstGeom>
+        </p:spPr>
+      </p:pic>
+      <p:sp>
+        <p:nvSpPr>
+          <p:cNvPr id="5" name="TextBox 4">
+            <a:extLst>
+              <a:ext uri="{FF2B5EF4-FFF2-40B4-BE49-F238E27FC236}">
+                <a16:creationId xmlns:a16="http://schemas.microsoft.com/office/drawing/2014/main" id="{E081D424-B0DC-F8D9-6025-D768A9931FD7}"/>
+              </a:ext>
+            </a:extLst>
+          </p:cNvPr>
+          <p:cNvSpPr txBox="1"/>
+          <p:nvPr/>
+        </p:nvSpPr>
+        <p:spPr>
+          <a:xfrm>
+            <a:off x="5416386" y="1920989"/>
+            <a:ext cx="6318267" cy="1200329"/>
+          </a:xfrm>
+          <a:prstGeom prst="rect">
+            <a:avLst/>
+          </a:prstGeom>
+          <a:noFill/>
+        </p:spPr>
+        <p:txBody>
+          <a:bodyPr wrap="square" rtlCol="0">
+            <a:spAutoFit/>
+          </a:bodyPr>
+          <a:lstStyle/>
+          <a:p>
+            <a:r>
+              <a:rPr lang="en-US" dirty="0"/>
+              <a:t>In fact, our </a:t>
+            </a:r>
+            <a:r>
+              <a:rPr lang="en-US" dirty="0" err="1"/>
+              <a:t>radiogenics</a:t>
+            </a:r>
+            <a:r>
+              <a:rPr lang="en-US" dirty="0"/>
+              <a:t> are probably dominated by this one. This potentially could be done natively in </a:t>
+            </a:r>
+            <a:r>
+              <a:rPr lang="en-US" dirty="0" err="1"/>
+              <a:t>SuperSim</a:t>
+            </a:r>
+            <a:r>
+              <a:rPr lang="en-US" dirty="0"/>
+              <a:t> as well as long as G4 has accurate S.F. I want to estimate how many decays we need for this one. </a:t>
+            </a:r>
+          </a:p>
+        </p:txBody>
+      </p:sp>
+    </p:spTree>
+    <p:extLst>
+      <p:ext uri="{BB962C8B-B14F-4D97-AF65-F5344CB8AC3E}">
+        <p14:creationId xmlns:p14="http://schemas.microsoft.com/office/powerpoint/2010/main" val="1887807154"/>
+      </p:ext>
+    </p:extLst>
+  </p:cSld>
+  <p:clrMapOvr>
+    <a:masterClrMapping/>
+  </p:clrMapOvr>
+</p:sld>
+</file>
+
 <file path=ppt/theme/theme1.xml><?xml version="1.0" encoding="utf-8"?>
 <a:theme xmlns:a="http://schemas.openxmlformats.org/drawingml/2006/main" name="Office Theme">
   <a:themeElements>

</xml_diff>

<commit_message>
[ANV] updated Cu flux note
</commit_message>
<xml_diff>
--- a/2-Flux/bknds_notes/an-simulation.pptx
+++ b/2-Flux/bknds_notes/an-simulation.pptx
@@ -12,6 +12,7 @@
     <p:sldId id="260" r:id="rId6"/>
     <p:sldId id="261" r:id="rId7"/>
     <p:sldId id="262" r:id="rId8"/>
+    <p:sldId id="263" r:id="rId9"/>
   </p:sldIdLst>
   <p:sldSz cx="12192000" cy="6858000"/>
   <p:notesSz cx="6858000" cy="9144000"/>
@@ -5418,7 +5419,7 @@
             </a:r>
             <a:r>
               <a:rPr lang="en-US" dirty="0"/>
-              <a:t> as well as long as G4 has accurate S.F. I want to estimate how many decays we need for this one. </a:t>
+              <a:t> as well, if G4 has accurate S.F. simulation. I want to estimate how many decays we need for this one. </a:t>
             </a:r>
           </a:p>
         </p:txBody>
@@ -5427,6 +5428,135 @@
     <p:extLst>
       <p:ext uri="{BB962C8B-B14F-4D97-AF65-F5344CB8AC3E}">
         <p14:creationId xmlns:p14="http://schemas.microsoft.com/office/powerpoint/2010/main" val="1887807154"/>
+      </p:ext>
+    </p:extLst>
+  </p:cSld>
+  <p:clrMapOvr>
+    <a:masterClrMapping/>
+  </p:clrMapOvr>
+</p:sld>
+</file>
+
+<file path=ppt/slides/slide8.xml><?xml version="1.0" encoding="utf-8"?>
+<p:sld xmlns:a="http://schemas.openxmlformats.org/drawingml/2006/main" xmlns:r="http://schemas.openxmlformats.org/officeDocument/2006/relationships" xmlns:p="http://schemas.openxmlformats.org/presentationml/2006/main">
+  <p:cSld>
+    <p:spTree>
+      <p:nvGrpSpPr>
+        <p:cNvPr id="1" name="">
+          <a:extLst>
+            <a:ext uri="{FF2B5EF4-FFF2-40B4-BE49-F238E27FC236}">
+              <a16:creationId xmlns:a16="http://schemas.microsoft.com/office/drawing/2014/main" id="{4FC5F615-3B31-3209-18A0-8C6F1F4A6B7E}"/>
+            </a:ext>
+          </a:extLst>
+        </p:cNvPr>
+        <p:cNvGrpSpPr/>
+        <p:nvPr/>
+      </p:nvGrpSpPr>
+      <p:grpSpPr>
+        <a:xfrm>
+          <a:off x="0" y="0"/>
+          <a:ext cx="0" cy="0"/>
+          <a:chOff x="0" y="0"/>
+          <a:chExt cx="0" cy="0"/>
+        </a:xfrm>
+      </p:grpSpPr>
+      <p:pic>
+        <p:nvPicPr>
+          <p:cNvPr id="4" name="Picture 3" descr="A graph of a graph of energy&#10;&#10;AI-generated content may be incorrect.">
+            <a:extLst>
+              <a:ext uri="{FF2B5EF4-FFF2-40B4-BE49-F238E27FC236}">
+                <a16:creationId xmlns:a16="http://schemas.microsoft.com/office/drawing/2014/main" id="{90C2727B-E378-C1E6-EB27-EA15C1913E81}"/>
+              </a:ext>
+            </a:extLst>
+          </p:cNvPr>
+          <p:cNvPicPr>
+            <a:picLocks noChangeAspect="1"/>
+          </p:cNvPicPr>
+          <p:nvPr/>
+        </p:nvPicPr>
+        <p:blipFill>
+          <a:blip r:embed="rId2"/>
+          <a:stretch>
+            <a:fillRect/>
+          </a:stretch>
+        </p:blipFill>
+        <p:spPr>
+          <a:xfrm>
+            <a:off x="610867" y="559446"/>
+            <a:ext cx="4426837" cy="3923414"/>
+          </a:xfrm>
+          <a:prstGeom prst="rect">
+            <a:avLst/>
+          </a:prstGeom>
+        </p:spPr>
+      </p:pic>
+      <p:sp>
+        <p:nvSpPr>
+          <p:cNvPr id="6" name="TextBox 5">
+            <a:extLst>
+              <a:ext uri="{FF2B5EF4-FFF2-40B4-BE49-F238E27FC236}">
+                <a16:creationId xmlns:a16="http://schemas.microsoft.com/office/drawing/2014/main" id="{7B75844F-F5DB-D2A7-2868-846F56A223D0}"/>
+              </a:ext>
+            </a:extLst>
+          </p:cNvPr>
+          <p:cNvSpPr txBox="1"/>
+          <p:nvPr/>
+        </p:nvSpPr>
+        <p:spPr>
+          <a:xfrm>
+            <a:off x="5416386" y="588498"/>
+            <a:ext cx="6189785" cy="646331"/>
+          </a:xfrm>
+          <a:prstGeom prst="rect">
+            <a:avLst/>
+          </a:prstGeom>
+          <a:noFill/>
+        </p:spPr>
+        <p:txBody>
+          <a:bodyPr wrap="square" rtlCol="0">
+            <a:spAutoFit/>
+          </a:bodyPr>
+          <a:lstStyle/>
+          <a:p>
+            <a:r>
+              <a:rPr lang="en-US" dirty="0"/>
+              <a:t>Integrating this spectrum, I get a total volumetric source rate </a:t>
+            </a:r>
+            <a:r>
+              <a:rPr lang="en-US"/>
+              <a:t>of </a:t>
+            </a:r>
+            <a:r>
+              <a:rPr lang="en-US" b="1"/>
+              <a:t>---x10</a:t>
+            </a:r>
+            <a:r>
+              <a:rPr lang="en-US" b="1" baseline="30000"/>
+              <a:t>-10</a:t>
+            </a:r>
+            <a:r>
+              <a:rPr lang="en-US" b="1"/>
+              <a:t> </a:t>
+            </a:r>
+            <a:r>
+              <a:rPr lang="en-US" b="1" dirty="0"/>
+              <a:t>neutrons/s/cm</a:t>
+            </a:r>
+            <a:r>
+              <a:rPr lang="en-US" b="1" baseline="30000" dirty="0"/>
+              <a:t>3</a:t>
+            </a:r>
+            <a:r>
+              <a:rPr lang="en-US" dirty="0"/>
+              <a:t>. </a:t>
+            </a:r>
+          </a:p>
+        </p:txBody>
+      </p:sp>
+    </p:spTree>
+    <p:extLst>
+      <p:ext uri="{BB962C8B-B14F-4D97-AF65-F5344CB8AC3E}">
+        <p14:creationId xmlns:p14="http://schemas.microsoft.com/office/powerpoint/2010/main" val="926934484"/>
       </p:ext>
     </p:extLst>
   </p:cSld>

</xml_diff>

<commit_message>
[ANV] updated Cu for spontaneous fission integration
</commit_message>
<xml_diff>
--- a/2-Flux/bknds_notes/an-simulation.pptx
+++ b/2-Flux/bknds_notes/an-simulation.pptx
@@ -5528,11 +5528,11 @@
             </a:r>
             <a:r>
               <a:rPr lang="en-US" b="1"/>
-              <a:t>---x10</a:t>
+              <a:t>3.41x10</a:t>
             </a:r>
             <a:r>
               <a:rPr lang="en-US" b="1" baseline="30000"/>
-              <a:t>-10</a:t>
+              <a:t>-9</a:t>
             </a:r>
             <a:r>
               <a:rPr lang="en-US" b="1"/>

</xml_diff>

<commit_message>
[ANV] updated the a,n background note for SuperCDMS
</commit_message>
<xml_diff>
--- a/2-Flux/bknds_notes/an-simulation.pptx
+++ b/2-Flux/bknds_notes/an-simulation.pptx
@@ -3329,12 +3329,141 @@
           <a:chExt cx="0" cy="0"/>
         </a:xfrm>
       </p:grpSpPr>
+      <p:sp>
+        <p:nvSpPr>
+          <p:cNvPr id="6" name="TextBox 5">
+            <a:extLst>
+              <a:ext uri="{FF2B5EF4-FFF2-40B4-BE49-F238E27FC236}">
+                <a16:creationId xmlns:a16="http://schemas.microsoft.com/office/drawing/2014/main" id="{8D7DE996-DF1E-3C97-7B73-4E320C5E44F1}"/>
+              </a:ext>
+            </a:extLst>
+          </p:cNvPr>
+          <p:cNvSpPr txBox="1"/>
+          <p:nvPr/>
+        </p:nvSpPr>
+        <p:spPr>
+          <a:xfrm>
+            <a:off x="5373858" y="759655"/>
+            <a:ext cx="6189785" cy="646331"/>
+          </a:xfrm>
+          <a:prstGeom prst="rect">
+            <a:avLst/>
+          </a:prstGeom>
+          <a:noFill/>
+        </p:spPr>
+        <p:txBody>
+          <a:bodyPr wrap="square" rtlCol="0">
+            <a:spAutoFit/>
+          </a:bodyPr>
+          <a:lstStyle/>
+          <a:p>
+            <a:r>
+              <a:rPr lang="en-US" dirty="0"/>
+              <a:t>This is the neutron volumetric spectrum that SOURCES 4A (mod) predicts for Copper with 1 ppb Th contamination. </a:t>
+            </a:r>
+          </a:p>
+        </p:txBody>
+      </p:sp>
+      <p:sp>
+        <p:nvSpPr>
+          <p:cNvPr id="7" name="TextBox 6">
+            <a:extLst>
+              <a:ext uri="{FF2B5EF4-FFF2-40B4-BE49-F238E27FC236}">
+                <a16:creationId xmlns:a16="http://schemas.microsoft.com/office/drawing/2014/main" id="{0EC0B1A1-4507-C290-9304-06B7CAFF45C8}"/>
+              </a:ext>
+            </a:extLst>
+          </p:cNvPr>
+          <p:cNvSpPr txBox="1"/>
+          <p:nvPr/>
+        </p:nvSpPr>
+        <p:spPr>
+          <a:xfrm>
+            <a:off x="5373857" y="1911515"/>
+            <a:ext cx="6189785" cy="646331"/>
+          </a:xfrm>
+          <a:prstGeom prst="rect">
+            <a:avLst/>
+          </a:prstGeom>
+          <a:noFill/>
+        </p:spPr>
+        <p:txBody>
+          <a:bodyPr wrap="square" rtlCol="0">
+            <a:spAutoFit/>
+          </a:bodyPr>
+          <a:lstStyle/>
+          <a:p>
+            <a:r>
+              <a:rPr lang="en-US" dirty="0"/>
+              <a:t>I want to use this to find out how many primary decays (from </a:t>
+            </a:r>
+            <a:r>
+              <a:rPr lang="en-US" baseline="30000" dirty="0"/>
+              <a:t>232</a:t>
+            </a:r>
+            <a:r>
+              <a:rPr lang="en-US" dirty="0"/>
+              <a:t>Th) it takes to create 1 neutron.</a:t>
+            </a:r>
+          </a:p>
+        </p:txBody>
+      </p:sp>
+      <p:sp>
+        <p:nvSpPr>
+          <p:cNvPr id="8" name="TextBox 7">
+            <a:extLst>
+              <a:ext uri="{FF2B5EF4-FFF2-40B4-BE49-F238E27FC236}">
+                <a16:creationId xmlns:a16="http://schemas.microsoft.com/office/drawing/2014/main" id="{B4E26518-7CFE-3176-C902-DF24E868F471}"/>
+              </a:ext>
+            </a:extLst>
+          </p:cNvPr>
+          <p:cNvSpPr txBox="1"/>
+          <p:nvPr/>
+        </p:nvSpPr>
+        <p:spPr>
+          <a:xfrm>
+            <a:off x="5373856" y="3177618"/>
+            <a:ext cx="6189785" cy="1477328"/>
+          </a:xfrm>
+          <a:prstGeom prst="rect">
+            <a:avLst/>
+          </a:prstGeom>
+          <a:noFill/>
+        </p:spPr>
+        <p:txBody>
+          <a:bodyPr wrap="square" rtlCol="0">
+            <a:spAutoFit/>
+          </a:bodyPr>
+          <a:lstStyle/>
+          <a:p>
+            <a:r>
+              <a:rPr lang="en-US" dirty="0"/>
+              <a:t>Producing 1 neutron in the Cu volumes of </a:t>
+            </a:r>
+            <a:r>
+              <a:rPr lang="en-US" dirty="0" err="1"/>
+              <a:t>SuperCDMS</a:t>
+            </a:r>
+            <a:r>
+              <a:rPr lang="en-US" dirty="0"/>
+              <a:t> will obviously not amount to many registered interactions in the detectors. Many will not hit the detectors at all. However, we could test this by creating a volumetric neutron source in the Cu of </a:t>
+            </a:r>
+            <a:r>
+              <a:rPr lang="en-US" dirty="0" err="1"/>
+              <a:t>SuperSim</a:t>
+            </a:r>
+            <a:r>
+              <a:rPr lang="en-US" dirty="0"/>
+              <a:t>.  </a:t>
+            </a:r>
+          </a:p>
+        </p:txBody>
+      </p:sp>
       <p:pic>
         <p:nvPicPr>
-          <p:cNvPr id="5" name="Picture 4" descr="A graph of a graph&#10;&#10;AI-generated content may be incorrect.">
-            <a:extLst>
-              <a:ext uri="{FF2B5EF4-FFF2-40B4-BE49-F238E27FC236}">
-                <a16:creationId xmlns:a16="http://schemas.microsoft.com/office/drawing/2014/main" id="{1A1327F9-6815-D9BC-FED4-2A05FF88146A}"/>
+          <p:cNvPr id="10" name="Picture 9" descr="A graph of a graph&#10;&#10;AI-generated content may be incorrect.">
+            <a:extLst>
+              <a:ext uri="{FF2B5EF4-FFF2-40B4-BE49-F238E27FC236}">
+                <a16:creationId xmlns:a16="http://schemas.microsoft.com/office/drawing/2014/main" id="{24B54C08-A2E9-07E0-165C-AAB7CF61A8AE}"/>
               </a:ext>
             </a:extLst>
           </p:cNvPr>
@@ -3351,143 +3480,14 @@
         </p:blipFill>
         <p:spPr>
           <a:xfrm>
-            <a:off x="867934" y="492370"/>
-            <a:ext cx="3661863" cy="3146913"/>
+            <a:off x="490132" y="251702"/>
+            <a:ext cx="4255078" cy="3710763"/>
           </a:xfrm>
           <a:prstGeom prst="rect">
             <a:avLst/>
           </a:prstGeom>
         </p:spPr>
       </p:pic>
-      <p:sp>
-        <p:nvSpPr>
-          <p:cNvPr id="6" name="TextBox 5">
-            <a:extLst>
-              <a:ext uri="{FF2B5EF4-FFF2-40B4-BE49-F238E27FC236}">
-                <a16:creationId xmlns:a16="http://schemas.microsoft.com/office/drawing/2014/main" id="{8D7DE996-DF1E-3C97-7B73-4E320C5E44F1}"/>
-              </a:ext>
-            </a:extLst>
-          </p:cNvPr>
-          <p:cNvSpPr txBox="1"/>
-          <p:nvPr/>
-        </p:nvSpPr>
-        <p:spPr>
-          <a:xfrm>
-            <a:off x="5373858" y="759655"/>
-            <a:ext cx="6189785" cy="646331"/>
-          </a:xfrm>
-          <a:prstGeom prst="rect">
-            <a:avLst/>
-          </a:prstGeom>
-          <a:noFill/>
-        </p:spPr>
-        <p:txBody>
-          <a:bodyPr wrap="square" rtlCol="0">
-            <a:spAutoFit/>
-          </a:bodyPr>
-          <a:lstStyle/>
-          <a:p>
-            <a:r>
-              <a:rPr lang="en-US" dirty="0"/>
-              <a:t>This is the neutron volumetric spectrum that SOURCES 4A (mod) predicts for Copper with 1 ppb Th contamination. </a:t>
-            </a:r>
-          </a:p>
-        </p:txBody>
-      </p:sp>
-      <p:sp>
-        <p:nvSpPr>
-          <p:cNvPr id="7" name="TextBox 6">
-            <a:extLst>
-              <a:ext uri="{FF2B5EF4-FFF2-40B4-BE49-F238E27FC236}">
-                <a16:creationId xmlns:a16="http://schemas.microsoft.com/office/drawing/2014/main" id="{0EC0B1A1-4507-C290-9304-06B7CAFF45C8}"/>
-              </a:ext>
-            </a:extLst>
-          </p:cNvPr>
-          <p:cNvSpPr txBox="1"/>
-          <p:nvPr/>
-        </p:nvSpPr>
-        <p:spPr>
-          <a:xfrm>
-            <a:off x="5373857" y="1911515"/>
-            <a:ext cx="6189785" cy="646331"/>
-          </a:xfrm>
-          <a:prstGeom prst="rect">
-            <a:avLst/>
-          </a:prstGeom>
-          <a:noFill/>
-        </p:spPr>
-        <p:txBody>
-          <a:bodyPr wrap="square" rtlCol="0">
-            <a:spAutoFit/>
-          </a:bodyPr>
-          <a:lstStyle/>
-          <a:p>
-            <a:r>
-              <a:rPr lang="en-US" dirty="0"/>
-              <a:t>I want to use this to find out how many primary decays (from </a:t>
-            </a:r>
-            <a:r>
-              <a:rPr lang="en-US" baseline="30000" dirty="0"/>
-              <a:t>232</a:t>
-            </a:r>
-            <a:r>
-              <a:rPr lang="en-US" dirty="0"/>
-              <a:t>Th) it takes to create 1 neutron.</a:t>
-            </a:r>
-          </a:p>
-        </p:txBody>
-      </p:sp>
-      <p:sp>
-        <p:nvSpPr>
-          <p:cNvPr id="8" name="TextBox 7">
-            <a:extLst>
-              <a:ext uri="{FF2B5EF4-FFF2-40B4-BE49-F238E27FC236}">
-                <a16:creationId xmlns:a16="http://schemas.microsoft.com/office/drawing/2014/main" id="{B4E26518-7CFE-3176-C902-DF24E868F471}"/>
-              </a:ext>
-            </a:extLst>
-          </p:cNvPr>
-          <p:cNvSpPr txBox="1"/>
-          <p:nvPr/>
-        </p:nvSpPr>
-        <p:spPr>
-          <a:xfrm>
-            <a:off x="5373856" y="3177618"/>
-            <a:ext cx="6189785" cy="1477328"/>
-          </a:xfrm>
-          <a:prstGeom prst="rect">
-            <a:avLst/>
-          </a:prstGeom>
-          <a:noFill/>
-        </p:spPr>
-        <p:txBody>
-          <a:bodyPr wrap="square" rtlCol="0">
-            <a:spAutoFit/>
-          </a:bodyPr>
-          <a:lstStyle/>
-          <a:p>
-            <a:r>
-              <a:rPr lang="en-US" dirty="0"/>
-              <a:t>Producing 1 neutron in the Cu volumes of </a:t>
-            </a:r>
-            <a:r>
-              <a:rPr lang="en-US" dirty="0" err="1"/>
-              <a:t>SuperCDMS</a:t>
-            </a:r>
-            <a:r>
-              <a:rPr lang="en-US" dirty="0"/>
-              <a:t> will obviously not amount to many registered interactions in the detectors. Many will not hit the detectors at all. However, we could test this by creating a volumetric neutron source in the Cu of </a:t>
-            </a:r>
-            <a:r>
-              <a:rPr lang="en-US" dirty="0" err="1"/>
-              <a:t>SuperSim</a:t>
-            </a:r>
-            <a:r>
-              <a:rPr lang="en-US" dirty="0"/>
-              <a:t>.  </a:t>
-            </a:r>
-          </a:p>
-        </p:txBody>
-      </p:sp>
     </p:spTree>
     <p:extLst>
       <p:ext uri="{BB962C8B-B14F-4D97-AF65-F5344CB8AC3E}">
@@ -3524,36 +3524,6 @@
           <a:chExt cx="0" cy="0"/>
         </a:xfrm>
       </p:grpSpPr>
-      <p:pic>
-        <p:nvPicPr>
-          <p:cNvPr id="5" name="Picture 4" descr="A graph of a graph&#10;&#10;AI-generated content may be incorrect.">
-            <a:extLst>
-              <a:ext uri="{FF2B5EF4-FFF2-40B4-BE49-F238E27FC236}">
-                <a16:creationId xmlns:a16="http://schemas.microsoft.com/office/drawing/2014/main" id="{4DB9C73D-B092-F93C-3407-74EEE5345DC6}"/>
-              </a:ext>
-            </a:extLst>
-          </p:cNvPr>
-          <p:cNvPicPr>
-            <a:picLocks noChangeAspect="1"/>
-          </p:cNvPicPr>
-          <p:nvPr/>
-        </p:nvPicPr>
-        <p:blipFill>
-          <a:blip r:embed="rId2"/>
-          <a:stretch>
-            <a:fillRect/>
-          </a:stretch>
-        </p:blipFill>
-        <p:spPr>
-          <a:xfrm>
-            <a:off x="867934" y="492370"/>
-            <a:ext cx="3661863" cy="3146913"/>
-          </a:xfrm>
-          <a:prstGeom prst="rect">
-            <a:avLst/>
-          </a:prstGeom>
-        </p:spPr>
-      </p:pic>
       <p:sp>
         <p:nvSpPr>
           <p:cNvPr id="8" name="TextBox 7">
@@ -3588,11 +3558,11 @@
             </a:r>
             <a:r>
               <a:rPr lang="en-US" b="1" dirty="0"/>
-              <a:t>1.81x10</a:t>
+              <a:t>2.85x10</a:t>
             </a:r>
             <a:r>
               <a:rPr lang="en-US" b="1" baseline="30000" dirty="0"/>
-              <a:t>-10</a:t>
+              <a:t>-11</a:t>
             </a:r>
             <a:r>
               <a:rPr lang="en-US" b="1" dirty="0"/>
@@ -3663,7 +3633,7 @@
                   <a:srgbClr val="C00000"/>
                 </a:solidFill>
               </a:rPr>
-              <a:t>0.0057 neutrons/cm</a:t>
+              <a:t>0.00090 neutrons/cm</a:t>
             </a:r>
             <a:r>
               <a:rPr lang="en-US" b="1" baseline="30000" dirty="0">
@@ -3687,7 +3657,7 @@
                   <a:srgbClr val="C00000"/>
                 </a:solidFill>
               </a:rPr>
-              <a:t>175 years </a:t>
+              <a:t>1113 years </a:t>
             </a:r>
             <a:r>
               <a:rPr lang="en-US" dirty="0">
@@ -3908,6 +3878,36 @@
           </a:p>
         </p:txBody>
       </p:sp>
+      <p:pic>
+        <p:nvPicPr>
+          <p:cNvPr id="13" name="Picture 12" descr="A graph of a graph&#10;&#10;AI-generated content may be incorrect.">
+            <a:extLst>
+              <a:ext uri="{FF2B5EF4-FFF2-40B4-BE49-F238E27FC236}">
+                <a16:creationId xmlns:a16="http://schemas.microsoft.com/office/drawing/2014/main" id="{E8D2F464-216C-71FC-1097-3E4BDF7C67C4}"/>
+              </a:ext>
+            </a:extLst>
+          </p:cNvPr>
+          <p:cNvPicPr>
+            <a:picLocks noChangeAspect="1"/>
+          </p:cNvPicPr>
+          <p:nvPr/>
+        </p:nvPicPr>
+        <p:blipFill>
+          <a:blip r:embed="rId2"/>
+          <a:stretch>
+            <a:fillRect/>
+          </a:stretch>
+        </p:blipFill>
+        <p:spPr>
+          <a:xfrm>
+            <a:off x="483501" y="251685"/>
+            <a:ext cx="4255078" cy="3710763"/>
+          </a:xfrm>
+          <a:prstGeom prst="rect">
+            <a:avLst/>
+          </a:prstGeom>
+        </p:spPr>
+      </p:pic>
     </p:spTree>
     <p:extLst>
       <p:ext uri="{BB962C8B-B14F-4D97-AF65-F5344CB8AC3E}">
@@ -5681,11 +5681,11 @@
           <a:p>
             <a:r>
               <a:rPr lang="en-US" b="1" dirty="0"/>
-              <a:t>1.81x10</a:t>
+              <a:t>2.85x10</a:t>
             </a:r>
             <a:r>
               <a:rPr lang="en-US" b="1" baseline="30000" dirty="0"/>
-              <a:t>-10</a:t>
+              <a:t>-11</a:t>
             </a:r>
             <a:r>
               <a:rPr lang="en-US" b="1" dirty="0"/>
@@ -5741,7 +5741,7 @@
                   <a:srgbClr val="C00000"/>
                 </a:solidFill>
               </a:rPr>
-              <a:t>861,878 decays/neutron </a:t>
+              <a:t>5,403,509 decays/neutron </a:t>
             </a:r>
           </a:p>
         </p:txBody>
@@ -5982,12 +5982,146 @@
           <a:chExt cx="0" cy="0"/>
         </a:xfrm>
       </p:grpSpPr>
+      <p:sp>
+        <p:nvSpPr>
+          <p:cNvPr id="6" name="TextBox 5">
+            <a:extLst>
+              <a:ext uri="{FF2B5EF4-FFF2-40B4-BE49-F238E27FC236}">
+                <a16:creationId xmlns:a16="http://schemas.microsoft.com/office/drawing/2014/main" id="{7B75844F-F5DB-D2A7-2868-846F56A223D0}"/>
+              </a:ext>
+            </a:extLst>
+          </p:cNvPr>
+          <p:cNvSpPr txBox="1"/>
+          <p:nvPr/>
+        </p:nvSpPr>
+        <p:spPr>
+          <a:xfrm>
+            <a:off x="5416386" y="588498"/>
+            <a:ext cx="6189785" cy="646331"/>
+          </a:xfrm>
+          <a:prstGeom prst="rect">
+            <a:avLst/>
+          </a:prstGeom>
+          <a:noFill/>
+        </p:spPr>
+        <p:txBody>
+          <a:bodyPr wrap="square" rtlCol="0">
+            <a:spAutoFit/>
+          </a:bodyPr>
+          <a:lstStyle/>
+          <a:p>
+            <a:r>
+              <a:rPr lang="en-US" dirty="0"/>
+              <a:t>Integrating this spectrum for </a:t>
+            </a:r>
+            <a:r>
+              <a:rPr lang="en-US" baseline="30000" dirty="0"/>
+              <a:t>238</a:t>
+            </a:r>
+            <a:r>
+              <a:rPr lang="en-US" dirty="0"/>
+              <a:t>U S.F., I get a total volumetric source rate of </a:t>
+            </a:r>
+            <a:r>
+              <a:rPr lang="en-US" b="1" dirty="0"/>
+              <a:t>5.37x10</a:t>
+            </a:r>
+            <a:r>
+              <a:rPr lang="en-US" b="1" baseline="30000" dirty="0"/>
+              <a:t>-10</a:t>
+            </a:r>
+            <a:r>
+              <a:rPr lang="en-US" b="1" dirty="0"/>
+              <a:t> neutrons/s/cm</a:t>
+            </a:r>
+            <a:r>
+              <a:rPr lang="en-US" b="1" baseline="30000" dirty="0"/>
+              <a:t>3</a:t>
+            </a:r>
+            <a:r>
+              <a:rPr lang="en-US" b="1" dirty="0"/>
+              <a:t>/ppb</a:t>
+            </a:r>
+            <a:r>
+              <a:rPr lang="en-US" dirty="0"/>
+              <a:t>. </a:t>
+            </a:r>
+          </a:p>
+        </p:txBody>
+      </p:sp>
+      <p:sp>
+        <p:nvSpPr>
+          <p:cNvPr id="7" name="TextBox 6">
+            <a:extLst>
+              <a:ext uri="{FF2B5EF4-FFF2-40B4-BE49-F238E27FC236}">
+                <a16:creationId xmlns:a16="http://schemas.microsoft.com/office/drawing/2014/main" id="{24B26FC4-21C5-9ADF-B821-5B5552FB08BF}"/>
+              </a:ext>
+            </a:extLst>
+          </p:cNvPr>
+          <p:cNvSpPr txBox="1"/>
+          <p:nvPr/>
+        </p:nvSpPr>
+        <p:spPr>
+          <a:xfrm>
+            <a:off x="5416386" y="1492265"/>
+            <a:ext cx="6318267" cy="923330"/>
+          </a:xfrm>
+          <a:prstGeom prst="rect">
+            <a:avLst/>
+          </a:prstGeom>
+          <a:noFill/>
+        </p:spPr>
+        <p:txBody>
+          <a:bodyPr wrap="square" rtlCol="0">
+            <a:spAutoFit/>
+          </a:bodyPr>
+          <a:lstStyle/>
+          <a:p>
+            <a:r>
+              <a:rPr lang="en-US" dirty="0"/>
+              <a:t>The same calculation as before: based on the density of Cu, and the level of 1 ppb, the number of </a:t>
+            </a:r>
+            <a:r>
+              <a:rPr lang="en-US" baseline="30000" dirty="0"/>
+              <a:t>238</a:t>
+            </a:r>
+            <a:r>
+              <a:rPr lang="en-US" dirty="0"/>
+              <a:t>U atoms present in copper is </a:t>
+            </a:r>
+            <a:r>
+              <a:rPr lang="en-US" b="1" dirty="0"/>
+              <a:t>9.99x10</a:t>
+            </a:r>
+            <a:r>
+              <a:rPr lang="en-US" b="1" baseline="30000" dirty="0"/>
+              <a:t>13</a:t>
+            </a:r>
+            <a:r>
+              <a:rPr lang="en-US" b="1" dirty="0"/>
+              <a:t> atoms/cm</a:t>
+            </a:r>
+            <a:r>
+              <a:rPr lang="en-US" b="1" baseline="30000" dirty="0"/>
+              <a:t>3</a:t>
+            </a:r>
+            <a:r>
+              <a:rPr lang="en-US" b="1" dirty="0"/>
+              <a:t>/ppb</a:t>
+            </a:r>
+            <a:r>
+              <a:rPr lang="en-US" dirty="0"/>
+              <a:t>. </a:t>
+            </a:r>
+          </a:p>
+        </p:txBody>
+      </p:sp>
       <p:pic>
         <p:nvPicPr>
-          <p:cNvPr id="4" name="Picture 3" descr="A graph of a graph of energy&#10;&#10;AI-generated content may be incorrect.">
-            <a:extLst>
-              <a:ext uri="{FF2B5EF4-FFF2-40B4-BE49-F238E27FC236}">
-                <a16:creationId xmlns:a16="http://schemas.microsoft.com/office/drawing/2014/main" id="{90C2727B-E378-C1E6-EB27-EA15C1913E81}"/>
+          <p:cNvPr id="13" name="Picture 12" descr="A graph of a graph with a line and numbers&#10;&#10;AI-generated content may be incorrect.">
+            <a:extLst>
+              <a:ext uri="{FF2B5EF4-FFF2-40B4-BE49-F238E27FC236}">
+                <a16:creationId xmlns:a16="http://schemas.microsoft.com/office/drawing/2014/main" id="{EDCD6935-35FB-A628-B33E-FEBD40D95DB0}"/>
               </a:ext>
             </a:extLst>
           </p:cNvPr>
@@ -6004,148 +6138,14 @@
         </p:blipFill>
         <p:spPr>
           <a:xfrm>
-            <a:off x="610867" y="559446"/>
-            <a:ext cx="4426837" cy="3923414"/>
+            <a:off x="685298" y="610227"/>
+            <a:ext cx="4451875" cy="3896072"/>
           </a:xfrm>
           <a:prstGeom prst="rect">
             <a:avLst/>
           </a:prstGeom>
         </p:spPr>
       </p:pic>
-      <p:sp>
-        <p:nvSpPr>
-          <p:cNvPr id="6" name="TextBox 5">
-            <a:extLst>
-              <a:ext uri="{FF2B5EF4-FFF2-40B4-BE49-F238E27FC236}">
-                <a16:creationId xmlns:a16="http://schemas.microsoft.com/office/drawing/2014/main" id="{7B75844F-F5DB-D2A7-2868-846F56A223D0}"/>
-              </a:ext>
-            </a:extLst>
-          </p:cNvPr>
-          <p:cNvSpPr txBox="1"/>
-          <p:nvPr/>
-        </p:nvSpPr>
-        <p:spPr>
-          <a:xfrm>
-            <a:off x="5416386" y="588498"/>
-            <a:ext cx="6189785" cy="646331"/>
-          </a:xfrm>
-          <a:prstGeom prst="rect">
-            <a:avLst/>
-          </a:prstGeom>
-          <a:noFill/>
-        </p:spPr>
-        <p:txBody>
-          <a:bodyPr wrap="square" rtlCol="0">
-            <a:spAutoFit/>
-          </a:bodyPr>
-          <a:lstStyle/>
-          <a:p>
-            <a:r>
-              <a:rPr lang="en-US" dirty="0"/>
-              <a:t>Integrating this spectrum for </a:t>
-            </a:r>
-            <a:r>
-              <a:rPr lang="en-US" baseline="30000" dirty="0"/>
-              <a:t>238</a:t>
-            </a:r>
-            <a:r>
-              <a:rPr lang="en-US" dirty="0"/>
-              <a:t>U S.F., I get a total volumetric source rate of </a:t>
-            </a:r>
-            <a:r>
-              <a:rPr lang="en-US" b="1" dirty="0"/>
-              <a:t>3.41x10</a:t>
-            </a:r>
-            <a:r>
-              <a:rPr lang="en-US" b="1" baseline="30000" dirty="0"/>
-              <a:t>-9</a:t>
-            </a:r>
-            <a:r>
-              <a:rPr lang="en-US" b="1" dirty="0"/>
-              <a:t> neutrons/s/cm</a:t>
-            </a:r>
-            <a:r>
-              <a:rPr lang="en-US" b="1" baseline="30000" dirty="0"/>
-              <a:t>3</a:t>
-            </a:r>
-            <a:r>
-              <a:rPr lang="en-US" b="1" dirty="0"/>
-              <a:t>/ppb</a:t>
-            </a:r>
-            <a:r>
-              <a:rPr lang="en-US" dirty="0"/>
-              <a:t>. </a:t>
-            </a:r>
-          </a:p>
-        </p:txBody>
-      </p:sp>
-      <p:sp>
-        <p:nvSpPr>
-          <p:cNvPr id="7" name="TextBox 6">
-            <a:extLst>
-              <a:ext uri="{FF2B5EF4-FFF2-40B4-BE49-F238E27FC236}">
-                <a16:creationId xmlns:a16="http://schemas.microsoft.com/office/drawing/2014/main" id="{24B26FC4-21C5-9ADF-B821-5B5552FB08BF}"/>
-              </a:ext>
-            </a:extLst>
-          </p:cNvPr>
-          <p:cNvSpPr txBox="1"/>
-          <p:nvPr/>
-        </p:nvSpPr>
-        <p:spPr>
-          <a:xfrm>
-            <a:off x="5416386" y="1492265"/>
-            <a:ext cx="6318267" cy="923330"/>
-          </a:xfrm>
-          <a:prstGeom prst="rect">
-            <a:avLst/>
-          </a:prstGeom>
-          <a:noFill/>
-        </p:spPr>
-        <p:txBody>
-          <a:bodyPr wrap="square" rtlCol="0">
-            <a:spAutoFit/>
-          </a:bodyPr>
-          <a:lstStyle/>
-          <a:p>
-            <a:r>
-              <a:rPr lang="en-US" dirty="0"/>
-              <a:t>The same calculation as before: based on the density of Cu, and the level of 1 ppb, the number of </a:t>
-            </a:r>
-            <a:r>
-              <a:rPr lang="en-US" baseline="30000" dirty="0"/>
-              <a:t>238</a:t>
-            </a:r>
-            <a:r>
-              <a:rPr lang="en-US" dirty="0"/>
-              <a:t>U atoms present in copper is </a:t>
-            </a:r>
-            <a:r>
-              <a:rPr lang="en-US" b="1" dirty="0"/>
-              <a:t>9.99x10</a:t>
-            </a:r>
-            <a:r>
-              <a:rPr lang="en-US" b="1" baseline="30000" dirty="0"/>
-              <a:t>13</a:t>
-            </a:r>
-            <a:r>
-              <a:rPr lang="en-US" b="1" dirty="0"/>
-              <a:t> atoms/cm</a:t>
-            </a:r>
-            <a:r>
-              <a:rPr lang="en-US" b="1" baseline="30000" dirty="0"/>
-              <a:t>3</a:t>
-            </a:r>
-            <a:r>
-              <a:rPr lang="en-US" b="1" dirty="0"/>
-              <a:t>/ppb</a:t>
-            </a:r>
-            <a:r>
-              <a:rPr lang="en-US" dirty="0"/>
-              <a:t>. </a:t>
-            </a:r>
-          </a:p>
-        </p:txBody>
-      </p:sp>
       <mc:AlternateContent xmlns:mc="http://schemas.openxmlformats.org/markup-compatibility/2006">
         <mc:Choice xmlns:a14="http://schemas.microsoft.com/office/drawing/2010/main" Requires="a14">
           <p:sp>
@@ -6613,10 +6613,10 @@
       </p:grpSpPr>
       <p:pic>
         <p:nvPicPr>
-          <p:cNvPr id="4" name="Picture 3" descr="A graph of a graph of energy&#10;&#10;AI-generated content may be incorrect.">
-            <a:extLst>
-              <a:ext uri="{FF2B5EF4-FFF2-40B4-BE49-F238E27FC236}">
-                <a16:creationId xmlns:a16="http://schemas.microsoft.com/office/drawing/2014/main" id="{65779921-5625-76A3-606F-0EC1E3B12D63}"/>
+          <p:cNvPr id="16" name="Picture 15" descr="A graph of a graph with a line and numbers&#10;&#10;AI-generated content may be incorrect.">
+            <a:extLst>
+              <a:ext uri="{FF2B5EF4-FFF2-40B4-BE49-F238E27FC236}">
+                <a16:creationId xmlns:a16="http://schemas.microsoft.com/office/drawing/2014/main" id="{19BDA35C-3E38-441E-5C6F-62FC5F536256}"/>
               </a:ext>
             </a:extLst>
           </p:cNvPr>
@@ -6633,8 +6633,8 @@
         </p:blipFill>
         <p:spPr>
           <a:xfrm>
-            <a:off x="610867" y="559446"/>
-            <a:ext cx="4426837" cy="3923414"/>
+            <a:off x="685298" y="610227"/>
+            <a:ext cx="4451875" cy="3896072"/>
           </a:xfrm>
           <a:prstGeom prst="rect">
             <a:avLst/>
@@ -6901,7 +6901,7 @@
         <p:spPr>
           <a:xfrm>
             <a:off x="7039415" y="3046400"/>
-            <a:ext cx="3289042" cy="369332"/>
+            <a:ext cx="3360728" cy="369332"/>
           </a:xfrm>
           <a:prstGeom prst="rect">
             <a:avLst/>
@@ -6916,11 +6916,11 @@
           <a:p>
             <a:r>
               <a:rPr lang="en-US" b="1" dirty="0"/>
-              <a:t>3.41x10</a:t>
+              <a:t>5.37x10</a:t>
             </a:r>
             <a:r>
               <a:rPr lang="en-US" b="1" baseline="30000" dirty="0"/>
-              <a:t>-9</a:t>
+              <a:t>-10</a:t>
             </a:r>
             <a:r>
               <a:rPr lang="en-US" b="1" dirty="0"/>
@@ -6976,7 +6976,7 @@
                   <a:srgbClr val="C00000"/>
                 </a:solidFill>
               </a:rPr>
-              <a:t>0.079 S.F./neutron </a:t>
+              <a:t>0.499 S.F./neutron </a:t>
             </a:r>
             <a:r>
               <a:rPr lang="en-US" dirty="0"/>
@@ -6988,7 +6988,7 @@
                   <a:srgbClr val="C00000"/>
                 </a:solidFill>
               </a:rPr>
-              <a:t>12.7 neutrons/S.F. </a:t>
+              <a:t>2.0 neutrons/S.F. </a:t>
             </a:r>
           </a:p>
         </p:txBody>
@@ -7008,7 +7008,7 @@
         <p:spPr>
           <a:xfrm>
             <a:off x="5384489" y="4934879"/>
-            <a:ext cx="6318267" cy="923330"/>
+            <a:ext cx="6318267" cy="1477328"/>
           </a:xfrm>
           <a:prstGeom prst="rect">
             <a:avLst/>
@@ -7031,7 +7031,7 @@
             </a:r>
             <a:r>
               <a:rPr lang="en-US" dirty="0"/>
-              <a:t>). We might in this case worry, however, that S.F. in G4 is modelled correctly—especially the correlations in neutrons emitted. </a:t>
+              <a:t>), and it roughly aligns with how many neutrons expected from fission. We might in this case worry, however, that S.F. in G4 is modelled correctly—especially the correlations in neutrons emitted. </a:t>
             </a:r>
             <a:r>
               <a:rPr lang="en-US" dirty="0">

</xml_diff>

<commit_message>
[ANV] added some notes
</commit_message>
<xml_diff>
--- a/2-Flux/bknds_notes/an-simulation.pptx
+++ b/2-Flux/bknds_notes/an-simulation.pptx
@@ -112,6 +112,11 @@
       </a:defRPr>
     </a:lvl9pPr>
   </p:defaultTextStyle>
+  <p:extLst>
+    <p:ext uri="{EFAFB233-063F-42B5-8137-9DF3F51BA10A}">
+      <p15:sldGuideLst xmlns:p15="http://schemas.microsoft.com/office/powerpoint/2012/main"/>
+    </p:ext>
+  </p:extLst>
 </p:presentation>
 </file>
 
@@ -262,7 +267,7 @@
           <a:p>
             <a:fld id="{851D23C5-F55E-9A4C-AAE2-FD966869692A}" type="datetimeFigureOut">
               <a:rPr lang="en-US" smtClean="0"/>
-              <a:t>1/28/26</a:t>
+              <a:t>2/10/26</a:t>
             </a:fld>
             <a:endParaRPr lang="en-US"/>
           </a:p>
@@ -460,7 +465,7 @@
           <a:p>
             <a:fld id="{851D23C5-F55E-9A4C-AAE2-FD966869692A}" type="datetimeFigureOut">
               <a:rPr lang="en-US" smtClean="0"/>
-              <a:t>1/28/26</a:t>
+              <a:t>2/10/26</a:t>
             </a:fld>
             <a:endParaRPr lang="en-US"/>
           </a:p>
@@ -668,7 +673,7 @@
           <a:p>
             <a:fld id="{851D23C5-F55E-9A4C-AAE2-FD966869692A}" type="datetimeFigureOut">
               <a:rPr lang="en-US" smtClean="0"/>
-              <a:t>1/28/26</a:t>
+              <a:t>2/10/26</a:t>
             </a:fld>
             <a:endParaRPr lang="en-US"/>
           </a:p>
@@ -866,7 +871,7 @@
           <a:p>
             <a:fld id="{851D23C5-F55E-9A4C-AAE2-FD966869692A}" type="datetimeFigureOut">
               <a:rPr lang="en-US" smtClean="0"/>
-              <a:t>1/28/26</a:t>
+              <a:t>2/10/26</a:t>
             </a:fld>
             <a:endParaRPr lang="en-US"/>
           </a:p>
@@ -1141,7 +1146,7 @@
           <a:p>
             <a:fld id="{851D23C5-F55E-9A4C-AAE2-FD966869692A}" type="datetimeFigureOut">
               <a:rPr lang="en-US" smtClean="0"/>
-              <a:t>1/28/26</a:t>
+              <a:t>2/10/26</a:t>
             </a:fld>
             <a:endParaRPr lang="en-US"/>
           </a:p>
@@ -1406,7 +1411,7 @@
           <a:p>
             <a:fld id="{851D23C5-F55E-9A4C-AAE2-FD966869692A}" type="datetimeFigureOut">
               <a:rPr lang="en-US" smtClean="0"/>
-              <a:t>1/28/26</a:t>
+              <a:t>2/10/26</a:t>
             </a:fld>
             <a:endParaRPr lang="en-US"/>
           </a:p>
@@ -1818,7 +1823,7 @@
           <a:p>
             <a:fld id="{851D23C5-F55E-9A4C-AAE2-FD966869692A}" type="datetimeFigureOut">
               <a:rPr lang="en-US" smtClean="0"/>
-              <a:t>1/28/26</a:t>
+              <a:t>2/10/26</a:t>
             </a:fld>
             <a:endParaRPr lang="en-US"/>
           </a:p>
@@ -1959,7 +1964,7 @@
           <a:p>
             <a:fld id="{851D23C5-F55E-9A4C-AAE2-FD966869692A}" type="datetimeFigureOut">
               <a:rPr lang="en-US" smtClean="0"/>
-              <a:t>1/28/26</a:t>
+              <a:t>2/10/26</a:t>
             </a:fld>
             <a:endParaRPr lang="en-US"/>
           </a:p>
@@ -2072,7 +2077,7 @@
           <a:p>
             <a:fld id="{851D23C5-F55E-9A4C-AAE2-FD966869692A}" type="datetimeFigureOut">
               <a:rPr lang="en-US" smtClean="0"/>
-              <a:t>1/28/26</a:t>
+              <a:t>2/10/26</a:t>
             </a:fld>
             <a:endParaRPr lang="en-US"/>
           </a:p>
@@ -2383,7 +2388,7 @@
           <a:p>
             <a:fld id="{851D23C5-F55E-9A4C-AAE2-FD966869692A}" type="datetimeFigureOut">
               <a:rPr lang="en-US" smtClean="0"/>
-              <a:t>1/28/26</a:t>
+              <a:t>2/10/26</a:t>
             </a:fld>
             <a:endParaRPr lang="en-US"/>
           </a:p>
@@ -2671,7 +2676,7 @@
           <a:p>
             <a:fld id="{851D23C5-F55E-9A4C-AAE2-FD966869692A}" type="datetimeFigureOut">
               <a:rPr lang="en-US" smtClean="0"/>
-              <a:t>1/28/26</a:t>
+              <a:t>2/10/26</a:t>
             </a:fld>
             <a:endParaRPr lang="en-US"/>
           </a:p>
@@ -2912,7 +2917,7 @@
           <a:p>
             <a:fld id="{851D23C5-F55E-9A4C-AAE2-FD966869692A}" type="datetimeFigureOut">
               <a:rPr lang="en-US" smtClean="0"/>
-              <a:t>1/28/26</a:t>
+              <a:t>2/10/26</a:t>
             </a:fld>
             <a:endParaRPr lang="en-US"/>
           </a:p>
@@ -4564,8 +4569,8 @@
           </a:prstGeom>
         </p:spPr>
       </p:pic>
-      <mc:AlternateContent xmlns:mc="http://schemas.openxmlformats.org/markup-compatibility/2006">
-        <mc:Choice xmlns:a14="http://schemas.microsoft.com/office/drawing/2010/main" Requires="a14">
+      <mc:AlternateContent xmlns:mc="http://schemas.openxmlformats.org/markup-compatibility/2006" xmlns:a14="http://schemas.microsoft.com/office/drawing/2010/main">
+        <mc:Choice Requires="a14">
           <p:sp>
             <p:nvSpPr>
               <p:cNvPr id="2" name="TextBox 1">
@@ -4959,6 +4964,7 @@
                 </a:endParaRPr>
               </a:p>
               <a:p>
+                <a:pPr/>
                 <a14:m>
                   <m:oMathPara xmlns:m="http://schemas.openxmlformats.org/officeDocument/2006/math">
                     <m:oMathParaPr>
@@ -5185,7 +5191,7 @@
             </p:txBody>
           </p:sp>
         </mc:Choice>
-        <mc:Fallback>
+        <mc:Fallback xmlns="">
           <p:sp>
             <p:nvSpPr>
               <p:cNvPr id="2" name="TextBox 1">
@@ -6146,8 +6152,8 @@
           </a:prstGeom>
         </p:spPr>
       </p:pic>
-      <mc:AlternateContent xmlns:mc="http://schemas.openxmlformats.org/markup-compatibility/2006">
-        <mc:Choice xmlns:a14="http://schemas.microsoft.com/office/drawing/2010/main" Requires="a14">
+      <mc:AlternateContent xmlns:mc="http://schemas.openxmlformats.org/markup-compatibility/2006" xmlns:a14="http://schemas.microsoft.com/office/drawing/2010/main">
+        <mc:Choice Requires="a14">
           <p:sp>
             <p:nvSpPr>
               <p:cNvPr id="9" name="TextBox 8">
@@ -6203,6 +6209,7 @@
                 </a:endParaRPr>
               </a:p>
               <a:p>
+                <a:pPr/>
                 <a14:m>
                   <m:oMathPara xmlns:m="http://schemas.openxmlformats.org/officeDocument/2006/math">
                     <m:oMathParaPr>
@@ -6445,7 +6452,7 @@
             </p:txBody>
           </p:sp>
         </mc:Choice>
-        <mc:Fallback>
+        <mc:Fallback xmlns="">
           <p:sp>
             <p:nvSpPr>
               <p:cNvPr id="9" name="TextBox 8">
@@ -6504,8 +6511,8 @@
         </p:nvSpPr>
         <p:spPr>
           <a:xfrm>
-            <a:off x="5416386" y="4633895"/>
-            <a:ext cx="6318267" cy="923330"/>
+            <a:off x="5137173" y="4633895"/>
+            <a:ext cx="6718129" cy="923330"/>
           </a:xfrm>
           <a:prstGeom prst="rect">
             <a:avLst/>
@@ -6532,11 +6539,19 @@
             </a:r>
             <a:r>
               <a:rPr lang="en-US" baseline="30000" dirty="0"/>
-              <a:t>-5 </a:t>
+              <a:t>-5 </a:t>
             </a:r>
             <a:r>
               <a:rPr lang="en-US" dirty="0"/>
-              <a:t>% , so that is 8.4 S.F. /yr/cm</a:t>
+              <a:t>% , so that is 8.4x10</a:t>
+            </a:r>
+            <a:r>
+              <a:rPr lang="en-US" baseline="30000" dirty="0"/>
+              <a:t>-3</a:t>
+            </a:r>
+            <a:r>
+              <a:rPr lang="en-US" dirty="0"/>
+              <a:t> S.F. /yr/cm</a:t>
             </a:r>
             <a:r>
               <a:rPr lang="en-US" baseline="30000" dirty="0"/>

</xml_diff>